<commit_message>
Created new file current.pptx
</commit_message>
<xml_diff>
--- a/GraphQL_v3.pptx
+++ b/GraphQL_v3.pptx
@@ -336,7 +336,7 @@
             <a:fld id="{1D8BD707-D9CF-40AE-B4C6-C98DA3205C09}" type="datetimeFigureOut">
               <a:rPr lang="en-US" smtClean="0"/>
               <a:pPr/>
-              <a:t>3/21/2019</a:t>
+              <a:t>3/26/2019</a:t>
             </a:fld>
             <a:endParaRPr lang="en-US"/>
           </a:p>
@@ -501,7 +501,7 @@
             <a:fld id="{1D8BD707-D9CF-40AE-B4C6-C98DA3205C09}" type="datetimeFigureOut">
               <a:rPr lang="en-US" smtClean="0"/>
               <a:pPr/>
-              <a:t>3/21/2019</a:t>
+              <a:t>3/26/2019</a:t>
             </a:fld>
             <a:endParaRPr lang="en-US"/>
           </a:p>
@@ -676,7 +676,7 @@
             <a:fld id="{1D8BD707-D9CF-40AE-B4C6-C98DA3205C09}" type="datetimeFigureOut">
               <a:rPr lang="en-US" smtClean="0"/>
               <a:pPr/>
-              <a:t>3/21/2019</a:t>
+              <a:t>3/26/2019</a:t>
             </a:fld>
             <a:endParaRPr lang="en-US"/>
           </a:p>
@@ -841,7 +841,7 @@
             <a:fld id="{1D8BD707-D9CF-40AE-B4C6-C98DA3205C09}" type="datetimeFigureOut">
               <a:rPr lang="en-US" smtClean="0"/>
               <a:pPr/>
-              <a:t>3/21/2019</a:t>
+              <a:t>3/26/2019</a:t>
             </a:fld>
             <a:endParaRPr lang="en-US"/>
           </a:p>
@@ -1083,7 +1083,7 @@
             <a:fld id="{1D8BD707-D9CF-40AE-B4C6-C98DA3205C09}" type="datetimeFigureOut">
               <a:rPr lang="en-US" smtClean="0"/>
               <a:pPr/>
-              <a:t>3/21/2019</a:t>
+              <a:t>3/26/2019</a:t>
             </a:fld>
             <a:endParaRPr lang="en-US"/>
           </a:p>
@@ -1365,7 +1365,7 @@
             <a:fld id="{1D8BD707-D9CF-40AE-B4C6-C98DA3205C09}" type="datetimeFigureOut">
               <a:rPr lang="en-US" smtClean="0"/>
               <a:pPr/>
-              <a:t>3/21/2019</a:t>
+              <a:t>3/26/2019</a:t>
             </a:fld>
             <a:endParaRPr lang="en-US"/>
           </a:p>
@@ -1781,7 +1781,7 @@
             <a:fld id="{1D8BD707-D9CF-40AE-B4C6-C98DA3205C09}" type="datetimeFigureOut">
               <a:rPr lang="en-US" smtClean="0"/>
               <a:pPr/>
-              <a:t>3/21/2019</a:t>
+              <a:t>3/26/2019</a:t>
             </a:fld>
             <a:endParaRPr lang="en-US"/>
           </a:p>
@@ -1895,7 +1895,7 @@
             <a:fld id="{1D8BD707-D9CF-40AE-B4C6-C98DA3205C09}" type="datetimeFigureOut">
               <a:rPr lang="en-US" smtClean="0"/>
               <a:pPr/>
-              <a:t>3/21/2019</a:t>
+              <a:t>3/26/2019</a:t>
             </a:fld>
             <a:endParaRPr lang="en-US"/>
           </a:p>
@@ -1987,7 +1987,7 @@
             <a:fld id="{1D8BD707-D9CF-40AE-B4C6-C98DA3205C09}" type="datetimeFigureOut">
               <a:rPr lang="en-US" smtClean="0"/>
               <a:pPr/>
-              <a:t>3/21/2019</a:t>
+              <a:t>3/26/2019</a:t>
             </a:fld>
             <a:endParaRPr lang="en-US"/>
           </a:p>
@@ -2259,7 +2259,7 @@
             <a:fld id="{1D8BD707-D9CF-40AE-B4C6-C98DA3205C09}" type="datetimeFigureOut">
               <a:rPr lang="en-US" smtClean="0"/>
               <a:pPr/>
-              <a:t>3/21/2019</a:t>
+              <a:t>3/26/2019</a:t>
             </a:fld>
             <a:endParaRPr lang="en-US"/>
           </a:p>
@@ -2508,7 +2508,7 @@
             <a:fld id="{1D8BD707-D9CF-40AE-B4C6-C98DA3205C09}" type="datetimeFigureOut">
               <a:rPr lang="en-US" smtClean="0"/>
               <a:pPr/>
-              <a:t>3/21/2019</a:t>
+              <a:t>3/26/2019</a:t>
             </a:fld>
             <a:endParaRPr lang="en-US"/>
           </a:p>
@@ -2716,7 +2716,7 @@
             <a:fld id="{1D8BD707-D9CF-40AE-B4C6-C98DA3205C09}" type="datetimeFigureOut">
               <a:rPr lang="en-US" smtClean="0"/>
               <a:pPr/>
-              <a:t>3/21/2019</a:t>
+              <a:t>3/26/2019</a:t>
             </a:fld>
             <a:endParaRPr lang="en-US"/>
           </a:p>
@@ -6085,7 +6085,7 @@
         <p:spPr>
           <a:xfrm>
             <a:off x="228600" y="304801"/>
-            <a:ext cx="8763000" cy="6463308"/>
+            <a:ext cx="8763000" cy="6740307"/>
           </a:xfrm>
           <a:prstGeom prst="rect">
             <a:avLst/>
@@ -6187,6 +6187,15 @@
             <a:endParaRPr lang="en-GB" dirty="0"/>
           </a:p>
           <a:p>
+            <a:endParaRPr lang="en-GB" dirty="0"/>
+          </a:p>
+          <a:p>
+            <a:r>
+              <a:rPr lang="en-GB" dirty="0">
+                <a:hlinkClick r:id="rId8"/>
+              </a:rPr>
+              <a:t>https://www.slideshare.net/InfoQ/serverless-graphql</a:t>
+            </a:r>
             <a:endParaRPr lang="en-GB" dirty="0"/>
           </a:p>
           <a:p>
@@ -6360,7 +6369,7 @@
           <a:p>
             <a:r>
               <a:rPr lang="en-GB" sz="4000" dirty="0"/>
-              <a:t>Data </a:t>
+              <a:t>Application Data </a:t>
             </a:r>
             <a:r>
               <a:rPr lang="en-GB" sz="4000" b="1" dirty="0"/>
@@ -6381,8 +6390,16 @@
         </p:nvSpPr>
         <p:spPr/>
         <p:txBody>
-          <a:bodyPr/>
-          <a:lstStyle/>
+          <a:bodyPr>
+            <a:normAutofit/>
+          </a:bodyPr>
+          <a:lstStyle/>
+          <a:p>
+            <a:r>
+              <a:rPr lang="en-GB" dirty="0"/>
+              <a:t>A lot of data in modern applications can be represented using a graph of nodes and edges,</a:t>
+            </a:r>
+          </a:p>
           <a:p>
             <a:r>
               <a:rPr lang="en-GB" dirty="0"/>
@@ -6780,7 +6797,7 @@
         <p:spPr>
           <a:xfrm>
             <a:off x="838200" y="1371600"/>
-            <a:ext cx="6657975" cy="2133600"/>
+            <a:ext cx="8075239" cy="2133600"/>
           </a:xfrm>
           <a:prstGeom prst="rect">
             <a:avLst/>

</xml_diff>